<commit_message>
Optimize PPT style and content conciseness
</commit_message>
<xml_diff>
--- a/backend/data/generated/Deal_Summary.pptx
+++ b/backend/data/generated/Deal_Summary.pptx
@@ -3165,7 +3165,7 @@
           <a:lstStyle/>
           <a:p>
             <a:r>
-              <a:t>Metrics Summary</a:t>
+              <a:t>Executive Summary</a:t>
             </a:r>
           </a:p>
         </p:txBody>
@@ -3184,132 +3184,41 @@
         <p:txBody>
           <a:bodyPr/>
           <a:lstStyle/>
-          <a:p>
-            <a:r>
-              <a:t>### Metrics Summary</a:t>
-            </a:r>
-          </a:p>
           <a:p/>
           <a:p>
-            <a:r>
-              <a:t>- **Total GLA (Gross Lettable Area):** 222,221 m²</a:t>
-            </a:r>
-          </a:p>
-          <a:p>
-            <a:r>
-              <a:t>- **Occupancy:** 100% (The entire area is leased to Ingram Micro)</a:t>
-            </a:r>
-          </a:p>
-          <a:p>
-            <a:r>
-              <a:t>- **WALT (Weighted Average Lease Term):** 5.4 Years</a:t>
-            </a:r>
-          </a:p>
-          <a:p>
-            <a:r>
-              <a:t>  - Calculation: </a:t>
-            </a:r>
-          </a:p>
-          <a:p>
-            <a:r>
-              <a:t>    - Ingram Micro Lease: 5 years (2015-2020)</a:t>
-            </a:r>
-          </a:p>
-          <a:p>
-            <a:r>
-              <a:t>    - CNH Industrial Lease: 19 years (2002-2021)</a:t>
-            </a:r>
-          </a:p>
-          <a:p>
-            <a:r>
-              <a:t>    - Weighted by area: </a:t>
-            </a:r>
-          </a:p>
-          <a:p>
-            <a:r>
-              <a:t>      \[</a:t>
-            </a:r>
-          </a:p>
-          <a:p>
-            <a:r>
-              <a:t>      \text{WALT} = \left(\frac{222,221 \times 5 + 90,998 \times 19}{222,221 + 90,998}\right) \approx 5.4 \text{ years}</a:t>
-            </a:r>
-          </a:p>
-          <a:p>
-            <a:r>
-              <a:t>      \]</a:t>
-            </a:r>
-          </a:p>
-          <a:p>
-            <a:r>
-              <a:t>- **In-Place Rent:**</a:t>
-            </a:r>
-          </a:p>
-          <a:p>
-            <a:r>
-              <a:t>  - Ingram Micro: £5.5/m²/year</a:t>
-            </a:r>
-          </a:p>
-          <a:p>
-            <a:r>
-              <a:t>  - CNH Industrial: £4.5/m²/year</a:t>
-            </a:r>
-          </a:p>
-          <a:p>
-            <a:r>
-              <a:t>  - Weighted Average Rent: </a:t>
-            </a:r>
-          </a:p>
-          <a:p>
-            <a:r>
-              <a:t>    \[</a:t>
-            </a:r>
-          </a:p>
-          <a:p>
-            <a:r>
-              <a:t>    \text{Average Rent} = \left(\frac{222,221 \times 5.5 + 90,998 \times 4.5}{222,221 + 90,998}\right) \approx £5.17/\text{m}^2/\text{year}</a:t>
-            </a:r>
-          </a:p>
-          <a:p>
-            <a:r>
-              <a:t>    \]</a:t>
-            </a:r>
-          </a:p>
-          <a:p>
-            <a:r>
-              <a:t>- **Additional Metrics:**</a:t>
-            </a:r>
-          </a:p>
-          <a:p>
-            <a:r>
-              <a:t>  - **Eaves Height:** 11.6 meters</a:t>
-            </a:r>
-          </a:p>
-          <a:p>
-            <a:r>
-              <a:t>  - **Dock Doors:** 12</a:t>
-            </a:r>
-          </a:p>
-          <a:p>
-            <a:r>
-              <a:t>  - **Level Access Doors:** 8</a:t>
-            </a:r>
-          </a:p>
-          <a:p>
-            <a:r>
-              <a:t>  - **Parking Spaces (Cars):** 180</a:t>
-            </a:r>
-          </a:p>
-          <a:p/>
-          <a:p>
-            <a:r>
-              <a:t>### Summary</a:t>
-            </a:r>
-          </a:p>
-          <a:p/>
-          <a:p>
-            <a:r>
-              <a:t>The asset "DC1 Ingram Micro" is a logistics property located in Daventry, United Kingdom, with a total gro</a:t>
+            <a:pPr/>
+            <a:r>
+              <a:t>Total GLA: 222,221 m²</a:t>
+            </a:r>
+          </a:p>
+          <a:p>
+            <a:pPr/>
+            <a:r>
+              <a:t>Occupancy: 100% (based on total leased area matching GLA)</a:t>
+            </a:r>
+          </a:p>
+          <a:p>
+            <a:pPr/>
+            <a:r>
+              <a:t>WALT: Not directly computable from provided data (requires weighted average calculation of lease terms)</a:t>
+            </a:r>
+          </a:p>
+          <a:p>
+            <a:pPr/>
+            <a:r>
+              <a:t>In-Place Rent: £5.5 per m² per annum (based on the lease with Ingram Micro)</a:t>
+            </a:r>
+          </a:p>
+          <a:p>
+            <a:pPr/>
+            <a:r>
+              <a:t>Key Highlight 1: Asset is a logistics facility with significant parking capacity (180 spaces)</a:t>
+            </a:r>
+          </a:p>
+          <a:p>
+            <a:pPr/>
+            <a:r>
+              <a:t>Key Highlight 2: Located in Daventry, UK, with a strategic logistics position</a:t>
             </a:r>
           </a:p>
         </p:txBody>

</xml_diff>

<commit_message>
Finalize PPT generation and financial model updates
</commit_message>
<xml_diff>
--- a/backend/data/generated/Deal_Summary.pptx
+++ b/backend/data/generated/Deal_Summary.pptx
@@ -3186,39 +3186,44 @@
           <a:lstStyle/>
           <a:p/>
           <a:p>
+            <a:r>
+              <a:t>Compute Metrics and Draft Summary:</a:t>
+            </a:r>
+          </a:p>
+          <a:p>
             <a:pPr/>
             <a:r>
-              <a:t>Total GLA: 222,221 m²</a:t>
+              <a:t>**Total GLA**: 313,219 m² (222,221 m² for Ingram Micro + 90,998 m² for CNH Industrial)</a:t>
             </a:r>
           </a:p>
           <a:p>
             <a:pPr/>
             <a:r>
-              <a:t>Occupancy: 100% (based on total leased area matching GLA)</a:t>
+              <a:t>**Occupancy**: Potentially 0% (leases for both tenants have expired)</a:t>
             </a:r>
           </a:p>
           <a:p>
             <a:pPr/>
             <a:r>
-              <a:t>WALT: Not directly computable from provided data (requires weighted average calculation of lease terms)</a:t>
+              <a:t>**WALT**: 0 years (Weighted Average Lease Term is 0 due to expired leases)</a:t>
             </a:r>
           </a:p>
           <a:p>
             <a:pPr/>
             <a:r>
-              <a:t>In-Place Rent: £5.5 per m² per annum (based on the lease with Ingram Micro)</a:t>
+              <a:t>**In-Place Rent**: Not applicable (leases have expired)</a:t>
             </a:r>
           </a:p>
           <a:p>
             <a:pPr/>
             <a:r>
-              <a:t>Key Highlight 1: Asset is a logistics facility with significant parking capacity (180 spaces)</a:t>
+              <a:t>**Key Highlight 1**: Strategic logistics location in Daventry, UK, with proximity to major transportation routes.</a:t>
             </a:r>
           </a:p>
           <a:p>
             <a:pPr/>
             <a:r>
-              <a:t>Key Highlight 2: Located in Daventry, UK, with a strategic logistics position</a:t>
+              <a:t>**Key Highlight 2**: Significant leasable area with potential for stable cash flow if leases are renewed or new tenants are secured.</a:t>
             </a:r>
           </a:p>
         </p:txBody>

</xml_diff>

<commit_message>
Fix NameError in deck generation node
</commit_message>
<xml_diff>
--- a/backend/data/generated/Deal_Summary.pptx
+++ b/backend/data/generated/Deal_Summary.pptx
@@ -3187,43 +3187,43 @@
           <a:p/>
           <a:p>
             <a:r>
-              <a:t>Compute Metrics and Draft Summary:</a:t>
+              <a:t>**Metrics Summary:**</a:t>
             </a:r>
           </a:p>
           <a:p>
             <a:pPr/>
             <a:r>
-              <a:t>**Total GLA**: 313,219 m² (222,221 m² for Ingram Micro + 90,998 m² for CNH Industrial)</a:t>
+              <a:t>**Total GLA**: 222,221 m²</a:t>
             </a:r>
           </a:p>
           <a:p>
             <a:pPr/>
             <a:r>
-              <a:t>**Occupancy**: Potentially 0% (leases for both tenants have expired)</a:t>
+              <a:t>**Occupancy**: 100% (based on the lease area matching the total asset area)</a:t>
             </a:r>
           </a:p>
           <a:p>
             <a:pPr/>
             <a:r>
-              <a:t>**WALT**: 0 years (Weighted Average Lease Term is 0 due to expired leases)</a:t>
+              <a:t>**WALT (Weighted Average Lease Term)**: Approximately 3.5 years (calculated from the lease end dates of 2020 and 2021, assuming the current year is 2018)</a:t>
             </a:r>
           </a:p>
           <a:p>
             <a:pPr/>
             <a:r>
-              <a:t>**In-Place Rent**: Not applicable (leases have expired)</a:t>
+              <a:t>**In-Place Rent**: £5.5 per m² per annum (based on the lease with Ingram Micro)</a:t>
             </a:r>
           </a:p>
           <a:p>
             <a:pPr/>
             <a:r>
-              <a:t>**Key Highlight 1**: Strategic logistics location in Daventry, UK, with proximity to major transportation routes.</a:t>
+              <a:t>**Key Highlight 1**: Strong tenant presence with Ingram Micro, a leading technology distributor.</a:t>
             </a:r>
           </a:p>
           <a:p>
             <a:pPr/>
             <a:r>
-              <a:t>**Key Highlight 2**: Significant leasable area with potential for stable cash flow if leases are renewed or new tenants are secured.</a:t>
+              <a:t>**Key Highlight 2**: Strategic location in Daventry, United Kingdom, with excellent logistics infrastructure including 12 dock doors and 180 parking spaces.</a:t>
             </a:r>
           </a:p>
         </p:txBody>

</xml_diff>

<commit_message>
Implement dynamic versioning for scenario decks (v2 Scenario A, v3 Scenario B...)
</commit_message>
<xml_diff>
--- a/backend/data/generated/Deal_Summary.pptx
+++ b/backend/data/generated/Deal_Summary.pptx
@@ -3187,43 +3187,43 @@
           <a:p/>
           <a:p>
             <a:r>
-              <a:t>**Metrics Summary:**</a:t>
+              <a:t>Compute Metrics and Draft Summary:</a:t>
             </a:r>
           </a:p>
           <a:p>
             <a:pPr/>
             <a:r>
-              <a:t>**Total GLA**: 222,221 m²</a:t>
+              <a:t>**Total GLA**: 313,219 m² (222,221 m² for Ingram Micro + 90,998 m² for CNH Industrial)</a:t>
             </a:r>
           </a:p>
           <a:p>
             <a:pPr/>
             <a:r>
-              <a:t>**Occupancy**: 100% (based on the lease area matching the total asset area)</a:t>
+              <a:t>**Occupancy**: 100% (Both areas are leased)</a:t>
             </a:r>
           </a:p>
           <a:p>
             <a:pPr/>
             <a:r>
-              <a:t>**WALT (Weighted Average Lease Term)**: Approximately 3.5 years (calculated from the lease end dates of 2020 and 2021, assuming the current year is 2018)</a:t>
+              <a:t>**WALT (Weighted Average Lease Term)**: Approximately 1.5 years (calculated from the lease end dates relative to the current date, assuming the current date is 2023)</a:t>
             </a:r>
           </a:p>
           <a:p>
             <a:pPr/>
             <a:r>
-              <a:t>**In-Place Rent**: £5.5 per m² per annum (based on the lease with Ingram Micro)</a:t>
+              <a:t>**In-Place Rent**: £5.1 per m² per annum (weighted average rent based on leased areas)</a:t>
             </a:r>
           </a:p>
           <a:p>
             <a:pPr/>
             <a:r>
-              <a:t>**Key Highlight 1**: Strong tenant presence with Ingram Micro, a leading technology distributor.</a:t>
+              <a:t>**Key Highlight 1**: The asset is a large logistics facility with significant parking and loading capabilities, featuring 12 dock doors and 8 level access doors.</a:t>
             </a:r>
           </a:p>
           <a:p>
             <a:pPr/>
             <a:r>
-              <a:t>**Key Highlight 2**: Strategic location in Daventry, United Kingdom, with excellent logistics infrastructure including 12 dock doors and 180 parking spaces.</a:t>
+              <a:t>**Key Highlight 2**: The asset is fully occupied by two major tenants in the technology distribution and agricultural equipment industries, ensuring stable rental income.</a:t>
             </a:r>
           </a:p>
         </p:txBody>

</xml_diff>

<commit_message>
Fix chatbot RAG flow and deck versioning
</commit_message>
<xml_diff>
--- a/backend/data/generated/Deal_Summary.pptx
+++ b/backend/data/generated/Deal_Summary.pptx
@@ -3193,37 +3193,67 @@
           <a:p>
             <a:pPr/>
             <a:r>
-              <a:t>**Total GLA**: 313,219 m² (222,221 m² for Ingram Micro + 90,998 m² for CNH Industrial)</a:t>
+              <a:t>**Total GLA**: 313,219 m²</a:t>
             </a:r>
           </a:p>
           <a:p>
             <a:pPr/>
             <a:r>
-              <a:t>**Occupancy**: 100% (Both areas are leased)</a:t>
+              <a:t>**Occupancy**: Fully leased</a:t>
             </a:r>
           </a:p>
           <a:p>
             <a:pPr/>
             <a:r>
-              <a:t>**WALT (Weighted Average Lease Term)**: Approximately 1.5 years (calculated from the lease end dates relative to the current date, assuming the current date is 2023)</a:t>
+              <a:t>**WALT (Weighted Average Lease Term)**: Calculation needed based on lease terms:</a:t>
             </a:r>
           </a:p>
           <a:p>
             <a:pPr/>
             <a:r>
-              <a:t>**In-Place Rent**: £5.1 per m² per annum (weighted average rent based on leased areas)</a:t>
+              <a:t>Ingram Micro: Lease ended in 2020 (0 years remaining)</a:t>
             </a:r>
           </a:p>
           <a:p>
             <a:pPr/>
             <a:r>
-              <a:t>**Key Highlight 1**: The asset is a large logistics facility with significant parking and loading capabilities, featuring 12 dock doors and 8 level access doors.</a:t>
+              <a:t>CNH Industrial: Lease ended in 2021 (0 years remaining)</a:t>
             </a:r>
           </a:p>
           <a:p>
             <a:pPr/>
             <a:r>
-              <a:t>**Key Highlight 2**: The asset is fully occupied by two major tenants in the technology distribution and agricultural equipment industries, ensuring stable rental income.</a:t>
+              <a:t>WALT = 0 years (as of the current date, assuming no renewals)</a:t>
+            </a:r>
+          </a:p>
+          <a:p>
+            <a:pPr/>
+            <a:r>
+              <a:t>**In-Place Rent**:</a:t>
+            </a:r>
+          </a:p>
+          <a:p>
+            <a:pPr/>
+            <a:r>
+              <a:t>Ingram Micro: £5.5/m²/year</a:t>
+            </a:r>
+          </a:p>
+          <a:p>
+            <a:pPr/>
+            <a:r>
+              <a:t>CNH Industrial: £4.5/m²/year</a:t>
+            </a:r>
+          </a:p>
+          <a:p>
+            <a:pPr/>
+            <a:r>
+              <a:t>**Key Highlight 1**: Stable tenant base with major tenants like Ingram Micro and CNH Industrial.</a:t>
+            </a:r>
+          </a:p>
+          <a:p>
+            <a:pPr/>
+            <a:r>
+              <a:t>**Key Highlight 2**: Potential vacancy risk due to expired leases, requiring attention for renewals or new tenants.</a:t>
             </a:r>
           </a:p>
         </p:txBody>

</xml_diff>